<commit_message>
updated repo picture in slide deck
</commit_message>
<xml_diff>
--- a/checkprops.pptx
+++ b/checkprops.pptx
@@ -382,11 +382,11 @@
           <c:showBubbleSize val="0"/>
         </c:dLbls>
         <c:gapWidth val="75"/>
-        <c:axId val="-2114615032"/>
-        <c:axId val="-2119485288"/>
+        <c:axId val="2029274312"/>
+        <c:axId val="2029277432"/>
       </c:barChart>
       <c:catAx>
-        <c:axId val="-2114615032"/>
+        <c:axId val="2029274312"/>
         <c:scaling>
           <c:orientation val="minMax"/>
         </c:scaling>
@@ -406,7 +406,7 @@
             <a:endParaRPr lang="en-US"/>
           </a:p>
         </c:txPr>
-        <c:crossAx val="-2119485288"/>
+        <c:crossAx val="2029277432"/>
         <c:crosses val="autoZero"/>
         <c:auto val="1"/>
         <c:lblAlgn val="ctr"/>
@@ -414,7 +414,7 @@
         <c:noMultiLvlLbl val="0"/>
       </c:catAx>
       <c:valAx>
-        <c:axId val="-2119485288"/>
+        <c:axId val="2029277432"/>
         <c:scaling>
           <c:orientation val="minMax"/>
         </c:scaling>
@@ -424,7 +424,7 @@
         <c:majorTickMark val="out"/>
         <c:minorTickMark val="none"/>
         <c:tickLblPos val="nextTo"/>
-        <c:crossAx val="-2114615032"/>
+        <c:crossAx val="2029274312"/>
         <c:crosses val="autoZero"/>
         <c:crossBetween val="between"/>
       </c:valAx>
@@ -772,11 +772,11 @@
           <c:showBubbleSize val="0"/>
         </c:dLbls>
         <c:gapWidth val="75"/>
-        <c:axId val="-2088332392"/>
-        <c:axId val="-2088329320"/>
+        <c:axId val="2029909000"/>
+        <c:axId val="2117840072"/>
       </c:barChart>
       <c:catAx>
-        <c:axId val="-2088332392"/>
+        <c:axId val="2029909000"/>
         <c:scaling>
           <c:orientation val="minMax"/>
         </c:scaling>
@@ -796,7 +796,7 @@
             <a:endParaRPr lang="en-US"/>
           </a:p>
         </c:txPr>
-        <c:crossAx val="-2088329320"/>
+        <c:crossAx val="2117840072"/>
         <c:crosses val="autoZero"/>
         <c:auto val="1"/>
         <c:lblAlgn val="ctr"/>
@@ -804,7 +804,7 @@
         <c:noMultiLvlLbl val="0"/>
       </c:catAx>
       <c:valAx>
-        <c:axId val="-2088329320"/>
+        <c:axId val="2117840072"/>
         <c:scaling>
           <c:orientation val="minMax"/>
         </c:scaling>
@@ -824,7 +824,7 @@
             <a:endParaRPr lang="en-US"/>
           </a:p>
         </c:txPr>
-        <c:crossAx val="-2088332392"/>
+        <c:crossAx val="2029909000"/>
         <c:crosses val="autoZero"/>
         <c:crossBetween val="between"/>
       </c:valAx>
@@ -14959,14 +14959,7 @@
                 <a:latin typeface="Menlo Regular"/>
                 <a:cs typeface="Menlo Regular"/>
               </a:rPr>
-              <a:t>)</a:t>
-            </a:r>
-            <a:r>
-              <a:rPr lang="en-US" sz="1200" dirty="0" smtClean="0">
-                <a:latin typeface="Menlo Regular"/>
-                <a:cs typeface="Menlo Regular"/>
-              </a:rPr>
-              <a:t>)</a:t>
+              <a:t>))</a:t>
             </a:r>
           </a:p>
           <a:p>
@@ -15075,14 +15068,7 @@
                 <a:latin typeface="Menlo Regular"/>
                 <a:cs typeface="Menlo Regular"/>
               </a:rPr>
-              <a:t>                  .</a:t>
-            </a:r>
-            <a:r>
-              <a:rPr lang="en-US" sz="1200" dirty="0" smtClean="0">
-                <a:latin typeface="Menlo Regular"/>
-                <a:cs typeface="Menlo Regular"/>
-              </a:rPr>
-              <a:t>Collect(</a:t>
+              <a:t>                  .Collect(</a:t>
             </a:r>
             <a:r>
               <a:rPr lang="en-US" sz="1200" dirty="0" err="1" smtClean="0">
@@ -18544,7 +18530,7 @@
       </p:grpSp>
       <p:pic>
         <p:nvPicPr>
-          <p:cNvPr id="3" name="Picture 2" descr="Screen Shot 2015-08-18 at 2140.46.png"/>
+          <p:cNvPr id="3" name="Picture 2"/>
           <p:cNvPicPr>
             <a:picLocks noChangeAspect="1"/>
           </p:cNvPicPr>
@@ -18564,8 +18550,8 @@
         </p:blipFill>
         <p:spPr>
           <a:xfrm>
-            <a:off x="1811530" y="612775"/>
-            <a:ext cx="5486399" cy="3832538"/>
+            <a:off x="2847034" y="612775"/>
+            <a:ext cx="3415391" cy="3832538"/>
           </a:xfrm>
           <a:prstGeom prst="rect">
             <a:avLst/>
@@ -26430,19 +26416,8 @@
                 <a:latin typeface="Menlo Regular"/>
                 <a:cs typeface="Menlo Regular"/>
               </a:rPr>
-              <a:t>&gt;</a:t>
-            </a:r>
-            <a:r>
-              <a:rPr lang="en-US" sz="1200" dirty="0" smtClean="0">
-                <a:latin typeface="Menlo Regular"/>
-                <a:cs typeface="Menlo Regular"/>
-              </a:rPr>
-              <a:t>(2, random )</a:t>
-            </a:r>
-            <a:endParaRPr lang="en-US" sz="1200" dirty="0" smtClean="0">
-              <a:latin typeface="Menlo Regular"/>
-              <a:cs typeface="Menlo Regular"/>
-            </a:endParaRPr>
+              <a:t>&gt;(2, random )</a:t>
+            </a:r>
           </a:p>
           <a:p>
             <a:pPr marL="0" indent="0">

</xml_diff>

<commit_message>
tweaked Mod4Binary generator in F#
</commit_message>
<xml_diff>
--- a/checkprops.pptx
+++ b/checkprops.pptx
@@ -382,11 +382,11 @@
           <c:showBubbleSize val="0"/>
         </c:dLbls>
         <c:gapWidth val="75"/>
-        <c:axId val="2029274312"/>
-        <c:axId val="2029277432"/>
+        <c:axId val="-2129289944"/>
+        <c:axId val="-2129369144"/>
       </c:barChart>
       <c:catAx>
-        <c:axId val="2029274312"/>
+        <c:axId val="-2129289944"/>
         <c:scaling>
           <c:orientation val="minMax"/>
         </c:scaling>
@@ -406,7 +406,7 @@
             <a:endParaRPr lang="en-US"/>
           </a:p>
         </c:txPr>
-        <c:crossAx val="2029277432"/>
+        <c:crossAx val="-2129369144"/>
         <c:crosses val="autoZero"/>
         <c:auto val="1"/>
         <c:lblAlgn val="ctr"/>
@@ -414,7 +414,7 @@
         <c:noMultiLvlLbl val="0"/>
       </c:catAx>
       <c:valAx>
-        <c:axId val="2029277432"/>
+        <c:axId val="-2129369144"/>
         <c:scaling>
           <c:orientation val="minMax"/>
         </c:scaling>
@@ -424,7 +424,7 @@
         <c:majorTickMark val="out"/>
         <c:minorTickMark val="none"/>
         <c:tickLblPos val="nextTo"/>
-        <c:crossAx val="2029274312"/>
+        <c:crossAx val="-2129289944"/>
         <c:crosses val="autoZero"/>
         <c:crossBetween val="between"/>
       </c:valAx>
@@ -772,11 +772,11 @@
           <c:showBubbleSize val="0"/>
         </c:dLbls>
         <c:gapWidth val="75"/>
-        <c:axId val="2029909000"/>
-        <c:axId val="2117840072"/>
+        <c:axId val="-2074615304"/>
+        <c:axId val="-2074612232"/>
       </c:barChart>
       <c:catAx>
-        <c:axId val="2029909000"/>
+        <c:axId val="-2074615304"/>
         <c:scaling>
           <c:orientation val="minMax"/>
         </c:scaling>
@@ -796,7 +796,7 @@
             <a:endParaRPr lang="en-US"/>
           </a:p>
         </c:txPr>
-        <c:crossAx val="2117840072"/>
+        <c:crossAx val="-2074612232"/>
         <c:crosses val="autoZero"/>
         <c:auto val="1"/>
         <c:lblAlgn val="ctr"/>
@@ -804,7 +804,7 @@
         <c:noMultiLvlLbl val="0"/>
       </c:catAx>
       <c:valAx>
-        <c:axId val="2117840072"/>
+        <c:axId val="-2074612232"/>
         <c:scaling>
           <c:orientation val="minMax"/>
         </c:scaling>
@@ -824,7 +824,7 @@
             <a:endParaRPr lang="en-US"/>
           </a:p>
         </c:txPr>
-        <c:crossAx val="2029909000"/>
+        <c:crossAx val="-2074615304"/>
         <c:crosses val="autoZero"/>
         <c:crossBetween val="between"/>
       </c:valAx>
@@ -10756,8 +10756,8 @@
         </p:nvSpPr>
         <p:spPr>
           <a:xfrm>
-            <a:off x="3575050" y="593198"/>
-            <a:ext cx="5111750" cy="4819126"/>
+            <a:off x="3575048" y="593197"/>
+            <a:ext cx="5193473" cy="4354282"/>
           </a:xfrm>
         </p:spPr>
         <p:txBody>
@@ -10770,24 +10770,7 @@
               <a:buNone/>
             </a:pPr>
             <a:r>
-              <a:rPr lang="en-US" sz="1200" dirty="0">
-                <a:solidFill>
-                  <a:schemeClr val="bg1">
-                    <a:lumMod val="50000"/>
-                  </a:schemeClr>
-                </a:solidFill>
-                <a:latin typeface="Menlo Regular"/>
-                <a:cs typeface="Menlo Regular"/>
-              </a:rPr>
-              <a:t>/// A byte[] whose length is evenly divisible by 4</a:t>
-            </a:r>
-          </a:p>
-          <a:p>
-            <a:pPr marL="0" indent="0">
-              <a:buNone/>
-            </a:pPr>
-            <a:r>
-              <a:rPr lang="en-US" sz="1200" dirty="0">
+              <a:rPr lang="en-US" sz="1200" dirty="0" smtClean="0">
                 <a:solidFill>
                   <a:srgbClr val="0000FF"/>
                 </a:solidFill>
@@ -10797,7 +10780,7 @@
               <a:t>type</a:t>
             </a:r>
             <a:r>
-              <a:rPr lang="en-US" sz="1200" dirty="0">
+              <a:rPr lang="en-US" sz="1200" dirty="0" smtClean="0">
                 <a:latin typeface="Menlo Regular"/>
                 <a:cs typeface="Menlo Regular"/>
               </a:rPr>
@@ -10867,7 +10850,10 @@
             <a:pPr marL="0" indent="0">
               <a:buNone/>
             </a:pPr>
-            <a:endParaRPr lang="en-US" sz="1200" dirty="0">
+            <a:endParaRPr lang="en-US" sz="1200" dirty="0" smtClean="0">
+              <a:solidFill>
+                <a:srgbClr val="222222"/>
+              </a:solidFill>
               <a:latin typeface="Menlo Regular"/>
               <a:cs typeface="Menlo Regular"/>
             </a:endParaRPr>
@@ -10877,14 +10863,24 @@
               <a:buNone/>
             </a:pPr>
             <a:r>
-              <a:rPr lang="en-US" sz="1200" dirty="0">
+              <a:rPr lang="en-US" sz="1200" dirty="0" smtClean="0">
                 <a:solidFill>
                   <a:srgbClr val="7F7F7F"/>
                 </a:solidFill>
                 <a:latin typeface="Menlo Regular"/>
                 <a:cs typeface="Menlo Regular"/>
               </a:rPr>
-              <a:t>// ... elsewhere ...</a:t>
+              <a:t>/</a:t>
+            </a:r>
+            <a:r>
+              <a:rPr lang="en-US" sz="1200" dirty="0">
+                <a:solidFill>
+                  <a:srgbClr val="7F7F7F"/>
+                </a:solidFill>
+                <a:latin typeface="Menlo Regular"/>
+                <a:cs typeface="Menlo Regular"/>
+              </a:rPr>
+              <a:t>/ ... elsewhere ...</a:t>
             </a:r>
           </a:p>
           <a:p>
@@ -10957,28 +10953,362 @@
               <a:t> </a:t>
             </a:r>
             <a:r>
+              <a:rPr lang="en-US" sz="1200" dirty="0" err="1" smtClean="0">
+                <a:latin typeface="Menlo Regular"/>
+                <a:cs typeface="Menlo Regular"/>
+              </a:rPr>
+              <a:t>isValid</a:t>
+            </a:r>
+            <a:r>
+              <a:rPr lang="en-US" sz="1200" dirty="0" smtClean="0">
+                <a:latin typeface="Menlo Regular"/>
+                <a:cs typeface="Menlo Regular"/>
+              </a:rPr>
+              <a:t> = </a:t>
+            </a:r>
+            <a:r>
+              <a:rPr lang="en-US" sz="1200" dirty="0" smtClean="0">
+                <a:solidFill>
+                  <a:srgbClr val="0000FF"/>
+                </a:solidFill>
+                <a:latin typeface="Menlo Regular"/>
+                <a:cs typeface="Menlo Regular"/>
+              </a:rPr>
+              <a:t>function</a:t>
+            </a:r>
+            <a:endParaRPr lang="en-US" sz="1200" dirty="0">
+              <a:solidFill>
+                <a:srgbClr val="0000FF"/>
+              </a:solidFill>
+              <a:latin typeface="Menlo Regular"/>
+              <a:cs typeface="Menlo Regular"/>
+            </a:endParaRPr>
+          </a:p>
+          <a:p>
+            <a:pPr marL="0" indent="0">
+              <a:buNone/>
+            </a:pPr>
+            <a:r>
+              <a:rPr lang="en-US" sz="1200" dirty="0">
+                <a:latin typeface="Menlo Regular"/>
+                <a:cs typeface="Menlo Regular"/>
+              </a:rPr>
+              <a:t> </a:t>
+            </a:r>
+            <a:r>
+              <a:rPr lang="en-US" sz="1200" dirty="0" smtClean="0">
+                <a:latin typeface="Menlo Regular"/>
+                <a:cs typeface="Menlo Regular"/>
+              </a:rPr>
+              <a:t>   </a:t>
+            </a:r>
+            <a:r>
+              <a:rPr lang="en-US" sz="1200" dirty="0" smtClean="0">
+                <a:latin typeface="Menlo Regular"/>
+                <a:cs typeface="Menlo Regular"/>
+              </a:rPr>
+              <a:t>| </a:t>
+            </a:r>
+            <a:r>
+              <a:rPr lang="en-US" sz="1200" dirty="0" smtClean="0">
+                <a:solidFill>
+                  <a:srgbClr val="0000FF"/>
+                </a:solidFill>
+                <a:latin typeface="Menlo Regular"/>
+                <a:cs typeface="Menlo Regular"/>
+              </a:rPr>
+              <a:t>null -&gt; false</a:t>
+            </a:r>
+          </a:p>
+          <a:p>
+            <a:pPr marL="0" indent="0">
+              <a:buNone/>
+            </a:pPr>
+            <a:r>
+              <a:rPr lang="en-US" sz="1200" dirty="0">
+                <a:latin typeface="Menlo Regular"/>
+                <a:cs typeface="Menlo Regular"/>
+              </a:rPr>
+              <a:t> </a:t>
+            </a:r>
+            <a:r>
+              <a:rPr lang="en-US" sz="1200" dirty="0" smtClean="0">
+                <a:latin typeface="Menlo Regular"/>
+                <a:cs typeface="Menlo Regular"/>
+              </a:rPr>
+              <a:t>   | data </a:t>
+            </a:r>
+            <a:r>
+              <a:rPr lang="en-US" sz="1200" dirty="0" smtClean="0">
+                <a:solidFill>
+                  <a:srgbClr val="0000FF"/>
+                </a:solidFill>
+                <a:latin typeface="Menlo Regular"/>
+                <a:cs typeface="Menlo Regular"/>
+              </a:rPr>
+              <a:t>-&gt;</a:t>
+            </a:r>
+            <a:r>
+              <a:rPr lang="en-US" sz="1200" dirty="0" smtClean="0">
+                <a:latin typeface="Menlo Regular"/>
+                <a:cs typeface="Menlo Regular"/>
+              </a:rPr>
+              <a:t> </a:t>
+            </a:r>
+            <a:r>
+              <a:rPr lang="en-US" sz="1200" dirty="0" smtClean="0">
+                <a:solidFill>
+                  <a:srgbClr val="0000FF"/>
+                </a:solidFill>
+                <a:latin typeface="Menlo Regular"/>
+                <a:cs typeface="Menlo Regular"/>
+              </a:rPr>
+              <a:t>let</a:t>
+            </a:r>
+            <a:r>
+              <a:rPr lang="en-US" sz="1200" dirty="0" smtClean="0">
+                <a:latin typeface="Menlo Regular"/>
+                <a:cs typeface="Menlo Regular"/>
+              </a:rPr>
+              <a:t> length = </a:t>
+            </a:r>
+            <a:r>
+              <a:rPr lang="en-US" sz="1200" dirty="0" err="1" smtClean="0">
+                <a:solidFill>
+                  <a:srgbClr val="247C9F"/>
+                </a:solidFill>
+                <a:latin typeface="Menlo Regular"/>
+                <a:cs typeface="Menlo Regular"/>
+              </a:rPr>
+              <a:t>Array</a:t>
+            </a:r>
+            <a:r>
+              <a:rPr lang="en-US" sz="1200" dirty="0" err="1" smtClean="0">
+                <a:latin typeface="Menlo Regular"/>
+                <a:cs typeface="Menlo Regular"/>
+              </a:rPr>
+              <a:t>.length</a:t>
+            </a:r>
+            <a:r>
+              <a:rPr lang="en-US" sz="1200" dirty="0" smtClean="0">
+                <a:latin typeface="Menlo Regular"/>
+                <a:cs typeface="Menlo Regular"/>
+              </a:rPr>
+              <a:t> data</a:t>
+            </a:r>
+          </a:p>
+          <a:p>
+            <a:pPr marL="0" indent="0">
+              <a:buNone/>
+            </a:pPr>
+            <a:r>
+              <a:rPr lang="en-US" sz="1200" dirty="0">
+                <a:latin typeface="Menlo Regular"/>
+                <a:cs typeface="Menlo Regular"/>
+              </a:rPr>
+              <a:t> </a:t>
+            </a:r>
+            <a:r>
+              <a:rPr lang="en-US" sz="1200" dirty="0" smtClean="0">
+                <a:latin typeface="Menlo Regular"/>
+                <a:cs typeface="Menlo Regular"/>
+              </a:rPr>
+              <a:t>             length </a:t>
+            </a:r>
+            <a:r>
+              <a:rPr lang="en-US" sz="1200" dirty="0" smtClean="0">
+                <a:latin typeface="Menlo Regular"/>
+                <a:cs typeface="Menlo Regular"/>
+              </a:rPr>
+              <a:t>&gt; </a:t>
+            </a:r>
+            <a:r>
+              <a:rPr lang="en-US" sz="1200" dirty="0" smtClean="0">
+                <a:solidFill>
+                  <a:schemeClr val="accent6">
+                    <a:lumMod val="60000"/>
+                    <a:lumOff val="40000"/>
+                  </a:schemeClr>
+                </a:solidFill>
+                <a:latin typeface="Menlo Regular"/>
+                <a:cs typeface="Menlo Regular"/>
+              </a:rPr>
+              <a:t>0</a:t>
+            </a:r>
+            <a:r>
+              <a:rPr lang="en-US" sz="1200" dirty="0" smtClean="0">
+                <a:latin typeface="Menlo Regular"/>
+                <a:cs typeface="Menlo Regular"/>
+              </a:rPr>
+              <a:t> &amp;</a:t>
+            </a:r>
+            <a:r>
+              <a:rPr lang="en-US" sz="1200" dirty="0" smtClean="0">
+                <a:latin typeface="Menlo Regular"/>
+                <a:cs typeface="Menlo Regular"/>
+              </a:rPr>
+              <a:t>&amp; </a:t>
+            </a:r>
+            <a:r>
+              <a:rPr lang="en-US" sz="1200" dirty="0" smtClean="0">
+                <a:latin typeface="Menlo Regular"/>
+                <a:cs typeface="Menlo Regular"/>
+              </a:rPr>
+              <a:t>length </a:t>
+            </a:r>
+            <a:r>
+              <a:rPr lang="en-US" sz="1200" dirty="0">
+                <a:latin typeface="Menlo Regular"/>
+                <a:cs typeface="Menlo Regular"/>
+              </a:rPr>
+              <a:t>% </a:t>
+            </a:r>
+            <a:r>
+              <a:rPr lang="en-US" sz="1200" dirty="0">
+                <a:solidFill>
+                  <a:srgbClr val="9F44E5"/>
+                </a:solidFill>
+                <a:latin typeface="Menlo Regular"/>
+                <a:cs typeface="Menlo Regular"/>
+              </a:rPr>
+              <a:t>4</a:t>
+            </a:r>
+            <a:r>
+              <a:rPr lang="en-US" sz="1200" dirty="0">
+                <a:latin typeface="Menlo Regular"/>
+                <a:cs typeface="Menlo Regular"/>
+              </a:rPr>
+              <a:t> = </a:t>
+            </a:r>
+            <a:r>
+              <a:rPr lang="en-US" sz="1200" dirty="0" smtClean="0">
+                <a:solidFill>
+                  <a:srgbClr val="9F44E5"/>
+                </a:solidFill>
+                <a:latin typeface="Menlo Regular"/>
+                <a:cs typeface="Menlo Regular"/>
+              </a:rPr>
+              <a:t>0</a:t>
+            </a:r>
+            <a:endParaRPr lang="en-US" sz="1200" dirty="0">
+              <a:solidFill>
+                <a:srgbClr val="9F44E5"/>
+              </a:solidFill>
+              <a:latin typeface="Menlo Regular"/>
+              <a:cs typeface="Menlo Regular"/>
+            </a:endParaRPr>
+          </a:p>
+          <a:p>
+            <a:pPr marL="0" indent="0">
+              <a:buNone/>
+            </a:pPr>
+            <a:r>
+              <a:rPr lang="en-US" sz="1200" dirty="0">
+                <a:latin typeface="Menlo Regular"/>
+                <a:cs typeface="Menlo Regular"/>
+              </a:rPr>
+              <a:t>  </a:t>
+            </a:r>
+            <a:endParaRPr lang="en-US" sz="1200" dirty="0" smtClean="0">
+              <a:latin typeface="Menlo Regular"/>
+              <a:cs typeface="Menlo Regular"/>
+            </a:endParaRPr>
+          </a:p>
+          <a:p>
+            <a:pPr marL="0" indent="0">
+              <a:buNone/>
+            </a:pPr>
+            <a:r>
+              <a:rPr lang="en-US" sz="1200" dirty="0" err="1" smtClean="0">
+                <a:solidFill>
+                  <a:srgbClr val="247C9F"/>
+                </a:solidFill>
+                <a:latin typeface="Menlo Regular"/>
+                <a:cs typeface="Menlo Regular"/>
+              </a:rPr>
+              <a:t>Arb</a:t>
+            </a:r>
+            <a:r>
+              <a:rPr lang="en-US" sz="1200" dirty="0" err="1" smtClean="0">
+                <a:latin typeface="Menlo Regular"/>
+                <a:cs typeface="Menlo Regular"/>
+              </a:rPr>
+              <a:t>.fromGenShrink</a:t>
+            </a:r>
+            <a:r>
+              <a:rPr lang="en-US" sz="1200" dirty="0" smtClean="0">
+                <a:latin typeface="Menlo Regular"/>
+                <a:cs typeface="Menlo Regular"/>
+              </a:rPr>
+              <a:t> </a:t>
+            </a:r>
+            <a:r>
+              <a:rPr lang="en-US" sz="1200" dirty="0">
+                <a:latin typeface="Menlo Regular"/>
+                <a:cs typeface="Menlo Regular"/>
+              </a:rPr>
+              <a:t>( </a:t>
+            </a:r>
+          </a:p>
+          <a:p>
+            <a:pPr marL="0" indent="0">
+              <a:buNone/>
+            </a:pPr>
+            <a:r>
+              <a:rPr lang="en-US" sz="1200" dirty="0">
+                <a:latin typeface="Menlo Regular"/>
+                <a:cs typeface="Menlo Regular"/>
+              </a:rPr>
+              <a:t>    </a:t>
+            </a:r>
+            <a:r>
+              <a:rPr lang="en-US" sz="1200" dirty="0">
+                <a:solidFill>
+                  <a:srgbClr val="7F7F7F"/>
+                </a:solidFill>
+                <a:latin typeface="Menlo Regular"/>
+                <a:cs typeface="Menlo Regular"/>
+              </a:rPr>
+              <a:t>// generator</a:t>
+            </a:r>
+          </a:p>
+          <a:p>
+            <a:pPr marL="0" indent="0">
+              <a:buNone/>
+            </a:pPr>
+            <a:r>
+              <a:rPr lang="en-US" sz="1200" dirty="0">
+                <a:latin typeface="Menlo Regular"/>
+                <a:cs typeface="Menlo Regular"/>
+              </a:rPr>
+              <a:t>    </a:t>
+            </a:r>
+            <a:r>
               <a:rPr lang="en-US" sz="1200" dirty="0" err="1">
-                <a:latin typeface="Menlo Regular"/>
-                <a:cs typeface="Menlo Regular"/>
-              </a:rPr>
-              <a:t>isValid</a:t>
-            </a:r>
-            <a:r>
-              <a:rPr lang="en-US" sz="1200" dirty="0">
-                <a:latin typeface="Menlo Regular"/>
-                <a:cs typeface="Menlo Regular"/>
-              </a:rPr>
-              <a:t> (</a:t>
+                <a:solidFill>
+                  <a:srgbClr val="247C9F"/>
+                </a:solidFill>
+                <a:latin typeface="Menlo Regular"/>
+                <a:cs typeface="Menlo Regular"/>
+              </a:rPr>
+              <a:t>Arb</a:t>
             </a:r>
             <a:r>
               <a:rPr lang="en-US" sz="1200" dirty="0" err="1">
                 <a:latin typeface="Menlo Regular"/>
                 <a:cs typeface="Menlo Regular"/>
               </a:rPr>
-              <a:t>data:</a:t>
-            </a:r>
-            <a:r>
-              <a:rPr lang="en-US" sz="1200" dirty="0" err="1">
+              <a:t>.generate</a:t>
+            </a:r>
+            <a:r>
+              <a:rPr lang="en-US" sz="1200" dirty="0" smtClean="0">
+                <a:latin typeface="Menlo Regular"/>
+                <a:cs typeface="Menlo Regular"/>
+              </a:rPr>
+              <a:t>&lt;</a:t>
+            </a:r>
+            <a:r>
+              <a:rPr lang="en-US" sz="1200" dirty="0" smtClean="0">
                 <a:solidFill>
                   <a:srgbClr val="247C9F"/>
                 </a:solidFill>
@@ -10988,61 +11318,11 @@
               <a:t>byte</a:t>
             </a:r>
             <a:r>
-              <a:rPr lang="en-US" sz="1200" dirty="0">
-                <a:latin typeface="Menlo Regular"/>
-                <a:cs typeface="Menlo Regular"/>
-              </a:rPr>
-              <a:t>[]) = data &lt;&gt; </a:t>
-            </a:r>
-            <a:r>
-              <a:rPr lang="en-US" sz="1200" dirty="0">
-                <a:solidFill>
-                  <a:srgbClr val="0000FF"/>
-                </a:solidFill>
-                <a:latin typeface="Menlo Regular"/>
-                <a:cs typeface="Menlo Regular"/>
-              </a:rPr>
-              <a:t>null </a:t>
-            </a:r>
-            <a:r>
               <a:rPr lang="en-US" sz="1200" dirty="0" smtClean="0">
                 <a:latin typeface="Menlo Regular"/>
                 <a:cs typeface="Menlo Regular"/>
               </a:rPr>
-              <a:t>    &amp;&amp;</a:t>
-            </a:r>
-          </a:p>
-          <a:p>
-            <a:pPr marL="0" indent="0">
-              <a:buNone/>
-            </a:pPr>
-            <a:r>
-              <a:rPr lang="en-US" sz="1200" dirty="0">
-                <a:latin typeface="Menlo Regular"/>
-                <a:cs typeface="Menlo Regular"/>
-              </a:rPr>
-              <a:t>	</a:t>
-            </a:r>
-            <a:r>
-              <a:rPr lang="en-US" sz="1200" dirty="0" smtClean="0">
-                <a:latin typeface="Menlo Regular"/>
-                <a:cs typeface="Menlo Regular"/>
-              </a:rPr>
-              <a:t>				     </a:t>
-            </a:r>
-            <a:r>
-              <a:rPr lang="en-US" sz="1200" dirty="0" err="1" smtClean="0">
-                <a:latin typeface="Menlo Regular"/>
-                <a:cs typeface="Menlo Regular"/>
-              </a:rPr>
-              <a:t>data.Length</a:t>
-            </a:r>
-            <a:r>
-              <a:rPr lang="en-US" sz="1200" dirty="0" smtClean="0">
-                <a:latin typeface="Menlo Regular"/>
-                <a:cs typeface="Menlo Regular"/>
-              </a:rPr>
-              <a:t> &gt; 0  &amp;&amp; </a:t>
+              <a:t>[]&gt;</a:t>
             </a:r>
             <a:endParaRPr lang="en-US" sz="1200" dirty="0">
               <a:latin typeface="Menlo Regular"/>
@@ -11058,34 +11338,39 @@
                 <a:latin typeface="Menlo Regular"/>
                 <a:cs typeface="Menlo Regular"/>
               </a:rPr>
-              <a:t>                              </a:t>
+              <a:t>    |&gt; </a:t>
             </a:r>
             <a:r>
               <a:rPr lang="en-US" sz="1200" dirty="0" err="1">
-                <a:latin typeface="Menlo Regular"/>
-                <a:cs typeface="Menlo Regular"/>
-              </a:rPr>
-              <a:t>data.Length</a:t>
-            </a:r>
-            <a:r>
-              <a:rPr lang="en-US" sz="1200" dirty="0">
-                <a:latin typeface="Menlo Regular"/>
-                <a:cs typeface="Menlo Regular"/>
-              </a:rPr>
-              <a:t> % 4 = </a:t>
-            </a:r>
-            <a:r>
-              <a:rPr lang="en-US" sz="1200" dirty="0" smtClean="0">
-                <a:latin typeface="Menlo Regular"/>
-                <a:cs typeface="Menlo Regular"/>
-              </a:rPr>
-              <a:t>0</a:t>
-            </a:r>
-          </a:p>
-          <a:p>
-            <a:pPr marL="0" indent="0">
-              <a:buNone/>
-            </a:pPr>
+                <a:solidFill>
+                  <a:srgbClr val="247C9F"/>
+                </a:solidFill>
+                <a:latin typeface="Menlo Regular"/>
+                <a:cs typeface="Menlo Regular"/>
+              </a:rPr>
+              <a:t>Gen</a:t>
+            </a:r>
+            <a:r>
+              <a:rPr lang="en-US" sz="1200" dirty="0" err="1">
+                <a:latin typeface="Menlo Regular"/>
+                <a:cs typeface="Menlo Regular"/>
+              </a:rPr>
+              <a:t>.suchThat</a:t>
+            </a:r>
+            <a:r>
+              <a:rPr lang="en-US" sz="1200" dirty="0">
+                <a:latin typeface="Menlo Regular"/>
+                <a:cs typeface="Menlo Regular"/>
+              </a:rPr>
+              <a:t> </a:t>
+            </a:r>
+            <a:r>
+              <a:rPr lang="en-US" sz="1200" dirty="0" err="1">
+                <a:latin typeface="Menlo Regular"/>
+                <a:cs typeface="Menlo Regular"/>
+              </a:rPr>
+              <a:t>isValid</a:t>
+            </a:r>
             <a:endParaRPr lang="en-US" sz="1200" dirty="0">
               <a:latin typeface="Menlo Regular"/>
               <a:cs typeface="Menlo Regular"/>
@@ -11100,7 +11385,7 @@
                 <a:latin typeface="Menlo Regular"/>
                 <a:cs typeface="Menlo Regular"/>
               </a:rPr>
-              <a:t>  </a:t>
+              <a:t>    |&gt; </a:t>
             </a:r>
             <a:r>
               <a:rPr lang="en-US" sz="1200" dirty="0" err="1">
@@ -11110,194 +11395,49 @@
                 <a:latin typeface="Menlo Regular"/>
                 <a:cs typeface="Menlo Regular"/>
               </a:rPr>
-              <a:t>Arb</a:t>
+              <a:t>Gen</a:t>
             </a:r>
             <a:r>
               <a:rPr lang="en-US" sz="1200" dirty="0" err="1">
                 <a:latin typeface="Menlo Regular"/>
                 <a:cs typeface="Menlo Regular"/>
               </a:rPr>
-              <a:t>.fromGenShrink</a:t>
-            </a:r>
-            <a:r>
-              <a:rPr lang="en-US" sz="1200" dirty="0">
-                <a:latin typeface="Menlo Regular"/>
-                <a:cs typeface="Menlo Regular"/>
-              </a:rPr>
-              <a:t> ( </a:t>
-            </a:r>
-          </a:p>
-          <a:p>
-            <a:pPr marL="0" indent="0">
-              <a:buNone/>
-            </a:pPr>
-            <a:r>
-              <a:rPr lang="en-US" sz="1200" dirty="0">
-                <a:latin typeface="Menlo Regular"/>
-                <a:cs typeface="Menlo Regular"/>
-              </a:rPr>
-              <a:t>    </a:t>
-            </a:r>
-            <a:r>
-              <a:rPr lang="en-US" sz="1200" dirty="0">
-                <a:solidFill>
-                  <a:srgbClr val="7F7F7F"/>
-                </a:solidFill>
-                <a:latin typeface="Menlo Regular"/>
-                <a:cs typeface="Menlo Regular"/>
-              </a:rPr>
-              <a:t>// generator</a:t>
-            </a:r>
-          </a:p>
-          <a:p>
-            <a:pPr marL="0" indent="0">
-              <a:buNone/>
-            </a:pPr>
-            <a:r>
-              <a:rPr lang="en-US" sz="1200" dirty="0">
-                <a:latin typeface="Menlo Regular"/>
-                <a:cs typeface="Menlo Regular"/>
-              </a:rPr>
-              <a:t>    </a:t>
-            </a:r>
-            <a:r>
-              <a:rPr lang="en-US" sz="1200" dirty="0" err="1">
-                <a:solidFill>
-                  <a:srgbClr val="247C9F"/>
-                </a:solidFill>
-                <a:latin typeface="Menlo Regular"/>
-                <a:cs typeface="Menlo Regular"/>
-              </a:rPr>
-              <a:t>Arb</a:t>
-            </a:r>
-            <a:r>
-              <a:rPr lang="en-US" sz="1200" dirty="0" err="1">
-                <a:latin typeface="Menlo Regular"/>
-                <a:cs typeface="Menlo Regular"/>
-              </a:rPr>
-              <a:t>.generate</a:t>
+              <a:t>.map</a:t>
+            </a:r>
+            <a:r>
+              <a:rPr lang="en-US" sz="1200" dirty="0">
+                <a:latin typeface="Menlo Regular"/>
+                <a:cs typeface="Menlo Regular"/>
+              </a:rPr>
+              <a:t> </a:t>
+            </a:r>
+            <a:r>
+              <a:rPr lang="en-US" sz="1200" dirty="0">
+                <a:solidFill>
+                  <a:srgbClr val="222222"/>
+                </a:solidFill>
+                <a:latin typeface="Menlo Regular"/>
+                <a:cs typeface="Menlo Regular"/>
+              </a:rPr>
+              <a:t>m</a:t>
             </a:r>
             <a:r>
               <a:rPr lang="en-US" sz="1200" dirty="0" smtClean="0">
-                <a:latin typeface="Menlo Regular"/>
-                <a:cs typeface="Menlo Regular"/>
-              </a:rPr>
-              <a:t>&lt;</a:t>
-            </a:r>
-            <a:r>
-              <a:rPr lang="en-US" sz="1200" dirty="0" smtClean="0">
-                <a:solidFill>
-                  <a:srgbClr val="247C9F"/>
-                </a:solidFill>
-                <a:latin typeface="Menlo Regular"/>
-                <a:cs typeface="Menlo Regular"/>
-              </a:rPr>
-              <a:t>byte</a:t>
-            </a:r>
-            <a:r>
-              <a:rPr lang="en-US" sz="1200" dirty="0" smtClean="0">
-                <a:latin typeface="Menlo Regular"/>
-                <a:cs typeface="Menlo Regular"/>
-              </a:rPr>
-              <a:t>[]&gt;</a:t>
+                <a:solidFill>
+                  <a:srgbClr val="222222"/>
+                </a:solidFill>
+                <a:latin typeface="Menlo Regular"/>
+                <a:cs typeface="Menlo Regular"/>
+              </a:rPr>
+              <a:t>od4Binary</a:t>
             </a:r>
             <a:endParaRPr lang="en-US" sz="1200" dirty="0">
+              <a:solidFill>
+                <a:srgbClr val="222222"/>
+              </a:solidFill>
               <a:latin typeface="Menlo Regular"/>
               <a:cs typeface="Menlo Regular"/>
             </a:endParaRPr>
-          </a:p>
-          <a:p>
-            <a:pPr marL="0" indent="0">
-              <a:buNone/>
-            </a:pPr>
-            <a:r>
-              <a:rPr lang="en-US" sz="1200" dirty="0">
-                <a:latin typeface="Menlo Regular"/>
-                <a:cs typeface="Menlo Regular"/>
-              </a:rPr>
-              <a:t>    |&gt; </a:t>
-            </a:r>
-            <a:r>
-              <a:rPr lang="en-US" sz="1200" dirty="0" err="1">
-                <a:solidFill>
-                  <a:srgbClr val="247C9F"/>
-                </a:solidFill>
-                <a:latin typeface="Menlo Regular"/>
-                <a:cs typeface="Menlo Regular"/>
-              </a:rPr>
-              <a:t>Gen</a:t>
-            </a:r>
-            <a:r>
-              <a:rPr lang="en-US" sz="1200" dirty="0" err="1">
-                <a:latin typeface="Menlo Regular"/>
-                <a:cs typeface="Menlo Regular"/>
-              </a:rPr>
-              <a:t>.suchThat</a:t>
-            </a:r>
-            <a:r>
-              <a:rPr lang="en-US" sz="1200" dirty="0">
-                <a:latin typeface="Menlo Regular"/>
-                <a:cs typeface="Menlo Regular"/>
-              </a:rPr>
-              <a:t> </a:t>
-            </a:r>
-            <a:r>
-              <a:rPr lang="en-US" sz="1200" dirty="0" err="1">
-                <a:latin typeface="Menlo Regular"/>
-                <a:cs typeface="Menlo Regular"/>
-              </a:rPr>
-              <a:t>isValid</a:t>
-            </a:r>
-            <a:endParaRPr lang="en-US" sz="1200" dirty="0">
-              <a:latin typeface="Menlo Regular"/>
-              <a:cs typeface="Menlo Regular"/>
-            </a:endParaRPr>
-          </a:p>
-          <a:p>
-            <a:pPr marL="0" indent="0">
-              <a:buNone/>
-            </a:pPr>
-            <a:r>
-              <a:rPr lang="en-US" sz="1200" dirty="0">
-                <a:latin typeface="Menlo Regular"/>
-                <a:cs typeface="Menlo Regular"/>
-              </a:rPr>
-              <a:t>    |&gt; </a:t>
-            </a:r>
-            <a:r>
-              <a:rPr lang="en-US" sz="1200" dirty="0" err="1">
-                <a:solidFill>
-                  <a:srgbClr val="247C9F"/>
-                </a:solidFill>
-                <a:latin typeface="Menlo Regular"/>
-                <a:cs typeface="Menlo Regular"/>
-              </a:rPr>
-              <a:t>Gen</a:t>
-            </a:r>
-            <a:r>
-              <a:rPr lang="en-US" sz="1200" dirty="0" err="1">
-                <a:latin typeface="Menlo Regular"/>
-                <a:cs typeface="Menlo Regular"/>
-              </a:rPr>
-              <a:t>.map</a:t>
-            </a:r>
-            <a:r>
-              <a:rPr lang="en-US" sz="1200" dirty="0">
-                <a:latin typeface="Menlo Regular"/>
-                <a:cs typeface="Menlo Regular"/>
-              </a:rPr>
-              <a:t> </a:t>
-            </a:r>
-            <a:r>
-              <a:rPr lang="en-US" sz="1200" dirty="0">
-                <a:solidFill>
-                  <a:srgbClr val="247C9F"/>
-                </a:solidFill>
-                <a:latin typeface="Menlo Regular"/>
-                <a:cs typeface="Menlo Regular"/>
-              </a:rPr>
-              <a:t>Mod4Binary</a:t>
-            </a:r>
           </a:p>
           <a:p>
             <a:pPr marL="0" indent="0">
@@ -11364,24 +11504,7 @@
                 <a:latin typeface="Menlo Regular"/>
                 <a:cs typeface="Menlo Regular"/>
               </a:rPr>
-              <a:t> (</a:t>
-            </a:r>
-            <a:r>
-              <a:rPr lang="en-US" sz="1200" dirty="0">
-                <a:solidFill>
-                  <a:srgbClr val="247C9F"/>
-                </a:solidFill>
-                <a:latin typeface="Menlo Regular"/>
-                <a:cs typeface="Menlo Regular"/>
-              </a:rPr>
-              <a:t>Mod4Binary</a:t>
-            </a:r>
-            <a:r>
-              <a:rPr lang="en-US" sz="1200" dirty="0">
-                <a:latin typeface="Menlo Regular"/>
-                <a:cs typeface="Menlo Regular"/>
-              </a:rPr>
-              <a:t> </a:t>
+              <a:t> (Mod4Binary </a:t>
             </a:r>
             <a:r>
               <a:rPr lang="en-US" sz="1200" dirty="0" smtClean="0">
@@ -11574,20 +11697,24 @@
             </a:r>
             <a:r>
               <a:rPr lang="en-US" sz="1200" dirty="0">
-                <a:solidFill>
-                  <a:srgbClr val="247C9F"/>
-                </a:solidFill>
-                <a:latin typeface="Menlo Regular"/>
-                <a:cs typeface="Menlo Regular"/>
-              </a:rPr>
-              <a:t>Mod4Binary</a:t>
-            </a:r>
-            <a:r>
-              <a:rPr lang="en-US" sz="1200" dirty="0">
-                <a:latin typeface="Menlo Regular"/>
-                <a:cs typeface="Menlo Regular"/>
-              </a:rPr>
-              <a:t> )</a:t>
+                <a:latin typeface="Menlo Regular"/>
+                <a:cs typeface="Menlo Regular"/>
+              </a:rPr>
+              <a:t>m</a:t>
+            </a:r>
+            <a:r>
+              <a:rPr lang="en-US" sz="1200" dirty="0" smtClean="0">
+                <a:latin typeface="Menlo Regular"/>
+                <a:cs typeface="Menlo Regular"/>
+              </a:rPr>
+              <a:t>od4Binary </a:t>
+            </a:r>
+            <a:r>
+              <a:rPr lang="en-US" sz="1200" dirty="0">
+                <a:latin typeface="Menlo Regular"/>
+                <a:cs typeface="Menlo Regular"/>
+              </a:rPr>
+              <a:t>)</a:t>
             </a:r>
             <a:endParaRPr lang="en-US" sz="1200" dirty="0">
               <a:solidFill>
@@ -18550,7 +18677,7 @@
         </p:blipFill>
         <p:spPr>
           <a:xfrm>
-            <a:off x="2847034" y="612775"/>
+            <a:off x="2858077" y="612775"/>
             <a:ext cx="3415391" cy="3832538"/>
           </a:xfrm>
           <a:prstGeom prst="rect">

</xml_diff>

<commit_message>
updated version of fszmq; minor tweaks to labelled tests example
</commit_message>
<xml_diff>
--- a/checkprops.pptx
+++ b/checkprops.pptx
@@ -382,11 +382,11 @@
           <c:showBubbleSize val="0"/>
         </c:dLbls>
         <c:gapWidth val="75"/>
-        <c:axId val="-2129289944"/>
-        <c:axId val="-2129369144"/>
+        <c:axId val="-2116658712"/>
+        <c:axId val="-2071444520"/>
       </c:barChart>
       <c:catAx>
-        <c:axId val="-2129289944"/>
+        <c:axId val="-2116658712"/>
         <c:scaling>
           <c:orientation val="minMax"/>
         </c:scaling>
@@ -406,7 +406,7 @@
             <a:endParaRPr lang="en-US"/>
           </a:p>
         </c:txPr>
-        <c:crossAx val="-2129369144"/>
+        <c:crossAx val="-2071444520"/>
         <c:crosses val="autoZero"/>
         <c:auto val="1"/>
         <c:lblAlgn val="ctr"/>
@@ -414,7 +414,7 @@
         <c:noMultiLvlLbl val="0"/>
       </c:catAx>
       <c:valAx>
-        <c:axId val="-2129369144"/>
+        <c:axId val="-2071444520"/>
         <c:scaling>
           <c:orientation val="minMax"/>
         </c:scaling>
@@ -424,7 +424,7 @@
         <c:majorTickMark val="out"/>
         <c:minorTickMark val="none"/>
         <c:tickLblPos val="nextTo"/>
-        <c:crossAx val="-2129289944"/>
+        <c:crossAx val="-2116658712"/>
         <c:crosses val="autoZero"/>
         <c:crossBetween val="between"/>
       </c:valAx>
@@ -772,11 +772,11 @@
           <c:showBubbleSize val="0"/>
         </c:dLbls>
         <c:gapWidth val="75"/>
-        <c:axId val="-2074615304"/>
-        <c:axId val="-2074612232"/>
+        <c:axId val="-2114208040"/>
+        <c:axId val="-2114204968"/>
       </c:barChart>
       <c:catAx>
-        <c:axId val="-2074615304"/>
+        <c:axId val="-2114208040"/>
         <c:scaling>
           <c:orientation val="minMax"/>
         </c:scaling>
@@ -796,7 +796,7 @@
             <a:endParaRPr lang="en-US"/>
           </a:p>
         </c:txPr>
-        <c:crossAx val="-2074612232"/>
+        <c:crossAx val="-2114204968"/>
         <c:crosses val="autoZero"/>
         <c:auto val="1"/>
         <c:lblAlgn val="ctr"/>
@@ -804,7 +804,7 @@
         <c:noMultiLvlLbl val="0"/>
       </c:catAx>
       <c:valAx>
-        <c:axId val="-2074612232"/>
+        <c:axId val="-2114204968"/>
         <c:scaling>
           <c:orientation val="minMax"/>
         </c:scaling>
@@ -824,7 +824,7 @@
             <a:endParaRPr lang="en-US"/>
           </a:p>
         </c:txPr>
-        <c:crossAx val="-2074615304"/>
+        <c:crossAx val="-2114208040"/>
         <c:crosses val="autoZero"/>
         <c:crossBetween val="between"/>
       </c:valAx>
@@ -938,7 +938,7 @@
           <a:p>
             <a:fld id="{8B4C81E6-A75C-D34B-8359-E5467513EF6F}" type="datetimeFigureOut">
               <a:rPr lang="en-US" smtClean="0"/>
-              <a:t>20 August8 15</a:t>
+              <a:t>21 August8 15</a:t>
             </a:fld>
             <a:endParaRPr lang="en-US"/>
           </a:p>
@@ -4784,7 +4784,7 @@
           <a:p>
             <a:fld id="{EE950D91-F1DC-3F41-B1A9-7D5983E6237B}" type="datetimeFigureOut">
               <a:rPr lang="en-US" smtClean="0"/>
-              <a:t>20 August8 15</a:t>
+              <a:t>21 August8 15</a:t>
             </a:fld>
             <a:endParaRPr lang="en-US"/>
           </a:p>
@@ -4954,7 +4954,7 @@
           <a:p>
             <a:fld id="{EE950D91-F1DC-3F41-B1A9-7D5983E6237B}" type="datetimeFigureOut">
               <a:rPr lang="en-US" smtClean="0"/>
-              <a:t>20 August8 15</a:t>
+              <a:t>21 August8 15</a:t>
             </a:fld>
             <a:endParaRPr lang="en-US"/>
           </a:p>
@@ -5134,7 +5134,7 @@
           <a:p>
             <a:fld id="{EE950D91-F1DC-3F41-B1A9-7D5983E6237B}" type="datetimeFigureOut">
               <a:rPr lang="en-US" smtClean="0"/>
-              <a:t>20 August8 15</a:t>
+              <a:t>21 August8 15</a:t>
             </a:fld>
             <a:endParaRPr lang="en-US"/>
           </a:p>
@@ -5304,7 +5304,7 @@
           <a:p>
             <a:fld id="{EE950D91-F1DC-3F41-B1A9-7D5983E6237B}" type="datetimeFigureOut">
               <a:rPr lang="en-US" smtClean="0"/>
-              <a:t>20 August8 15</a:t>
+              <a:t>21 August8 15</a:t>
             </a:fld>
             <a:endParaRPr lang="en-US"/>
           </a:p>
@@ -5550,7 +5550,7 @@
           <a:p>
             <a:fld id="{EE950D91-F1DC-3F41-B1A9-7D5983E6237B}" type="datetimeFigureOut">
               <a:rPr lang="en-US" smtClean="0"/>
-              <a:t>20 August8 15</a:t>
+              <a:t>21 August8 15</a:t>
             </a:fld>
             <a:endParaRPr lang="en-US"/>
           </a:p>
@@ -5838,7 +5838,7 @@
           <a:p>
             <a:fld id="{EE950D91-F1DC-3F41-B1A9-7D5983E6237B}" type="datetimeFigureOut">
               <a:rPr lang="en-US" smtClean="0"/>
-              <a:t>20 August8 15</a:t>
+              <a:t>21 August8 15</a:t>
             </a:fld>
             <a:endParaRPr lang="en-US"/>
           </a:p>
@@ -6260,7 +6260,7 @@
           <a:p>
             <a:fld id="{EE950D91-F1DC-3F41-B1A9-7D5983E6237B}" type="datetimeFigureOut">
               <a:rPr lang="en-US" smtClean="0"/>
-              <a:t>20 August8 15</a:t>
+              <a:t>21 August8 15</a:t>
             </a:fld>
             <a:endParaRPr lang="en-US"/>
           </a:p>
@@ -6378,7 +6378,7 @@
           <a:p>
             <a:fld id="{EE950D91-F1DC-3F41-B1A9-7D5983E6237B}" type="datetimeFigureOut">
               <a:rPr lang="en-US" smtClean="0"/>
-              <a:t>20 August8 15</a:t>
+              <a:t>21 August8 15</a:t>
             </a:fld>
             <a:endParaRPr lang="en-US"/>
           </a:p>
@@ -6473,7 +6473,7 @@
           <a:p>
             <a:fld id="{EE950D91-F1DC-3F41-B1A9-7D5983E6237B}" type="datetimeFigureOut">
               <a:rPr lang="en-US" smtClean="0"/>
-              <a:t>20 August8 15</a:t>
+              <a:t>21 August8 15</a:t>
             </a:fld>
             <a:endParaRPr lang="en-US"/>
           </a:p>
@@ -6750,7 +6750,7 @@
           <a:p>
             <a:fld id="{EE950D91-F1DC-3F41-B1A9-7D5983E6237B}" type="datetimeFigureOut">
               <a:rPr lang="en-US" smtClean="0"/>
-              <a:t>20 August8 15</a:t>
+              <a:t>21 August8 15</a:t>
             </a:fld>
             <a:endParaRPr lang="en-US"/>
           </a:p>
@@ -7003,7 +7003,7 @@
           <a:p>
             <a:fld id="{EE950D91-F1DC-3F41-B1A9-7D5983E6237B}" type="datetimeFigureOut">
               <a:rPr lang="en-US" smtClean="0"/>
-              <a:t>20 August8 15</a:t>
+              <a:t>21 August8 15</a:t>
             </a:fld>
             <a:endParaRPr lang="en-US"/>
           </a:p>
@@ -7216,7 +7216,7 @@
           <a:p>
             <a:fld id="{EE950D91-F1DC-3F41-B1A9-7D5983E6237B}" type="datetimeFigureOut">
               <a:rPr lang="en-US" smtClean="0"/>
-              <a:t>20 August8 15</a:t>
+              <a:t>21 August8 15</a:t>
             </a:fld>
             <a:endParaRPr lang="en-US"/>
           </a:p>
@@ -11000,161 +11000,77 @@
                 <a:latin typeface="Menlo Regular"/>
                 <a:cs typeface="Menlo Regular"/>
               </a:rPr>
-              <a:t>   </a:t>
+              <a:t>   | </a:t>
             </a:r>
             <a:r>
               <a:rPr lang="en-US" sz="1200" dirty="0" smtClean="0">
-                <a:latin typeface="Menlo Regular"/>
-                <a:cs typeface="Menlo Regular"/>
-              </a:rPr>
-              <a:t>| </a:t>
+                <a:solidFill>
+                  <a:srgbClr val="0000FF"/>
+                </a:solidFill>
+                <a:latin typeface="Menlo Regular"/>
+                <a:cs typeface="Menlo Regular"/>
+              </a:rPr>
+              <a:t>null -&gt; false</a:t>
+            </a:r>
+          </a:p>
+          <a:p>
+            <a:pPr marL="0" indent="0">
+              <a:buNone/>
+            </a:pPr>
+            <a:r>
+              <a:rPr lang="en-US" sz="1200" dirty="0">
+                <a:latin typeface="Menlo Regular"/>
+                <a:cs typeface="Menlo Regular"/>
+              </a:rPr>
+              <a:t> </a:t>
             </a:r>
             <a:r>
               <a:rPr lang="en-US" sz="1200" dirty="0" smtClean="0">
+                <a:latin typeface="Menlo Regular"/>
+                <a:cs typeface="Menlo Regular"/>
+              </a:rPr>
+              <a:t>   | data </a:t>
+            </a:r>
+            <a:r>
+              <a:rPr lang="en-US" sz="1200" dirty="0" smtClean="0">
                 <a:solidFill>
                   <a:srgbClr val="0000FF"/>
                 </a:solidFill>
                 <a:latin typeface="Menlo Regular"/>
                 <a:cs typeface="Menlo Regular"/>
               </a:rPr>
-              <a:t>null -&gt; false</a:t>
-            </a:r>
-          </a:p>
-          <a:p>
-            <a:pPr marL="0" indent="0">
-              <a:buNone/>
-            </a:pPr>
-            <a:r>
-              <a:rPr lang="en-US" sz="1200" dirty="0">
+              <a:t>-&gt;</a:t>
+            </a:r>
+            <a:r>
+              <a:rPr lang="en-US" sz="1200" dirty="0" smtClean="0">
                 <a:latin typeface="Menlo Regular"/>
                 <a:cs typeface="Menlo Regular"/>
               </a:rPr>
               <a:t> </a:t>
             </a:r>
             <a:r>
+              <a:rPr lang="en-US" sz="1200" dirty="0" err="1" smtClean="0">
+                <a:solidFill>
+                  <a:srgbClr val="247C9F"/>
+                </a:solidFill>
+                <a:latin typeface="Menlo Regular"/>
+                <a:cs typeface="Menlo Regular"/>
+              </a:rPr>
+              <a:t>Array</a:t>
+            </a:r>
+            <a:r>
+              <a:rPr lang="en-US" sz="1200" dirty="0" err="1" smtClean="0">
+                <a:latin typeface="Menlo Regular"/>
+                <a:cs typeface="Menlo Regular"/>
+              </a:rPr>
+              <a:t>.length</a:t>
+            </a:r>
+            <a:r>
               <a:rPr lang="en-US" sz="1200" dirty="0" smtClean="0">
                 <a:latin typeface="Menlo Regular"/>
                 <a:cs typeface="Menlo Regular"/>
               </a:rPr>
-              <a:t>   | data </a:t>
-            </a:r>
-            <a:r>
-              <a:rPr lang="en-US" sz="1200" dirty="0" smtClean="0">
-                <a:solidFill>
-                  <a:srgbClr val="0000FF"/>
-                </a:solidFill>
-                <a:latin typeface="Menlo Regular"/>
-                <a:cs typeface="Menlo Regular"/>
-              </a:rPr>
-              <a:t>-&gt;</a:t>
-            </a:r>
-            <a:r>
-              <a:rPr lang="en-US" sz="1200" dirty="0" smtClean="0">
-                <a:latin typeface="Menlo Regular"/>
-                <a:cs typeface="Menlo Regular"/>
-              </a:rPr>
-              <a:t> </a:t>
-            </a:r>
-            <a:r>
-              <a:rPr lang="en-US" sz="1200" dirty="0" smtClean="0">
-                <a:solidFill>
-                  <a:srgbClr val="0000FF"/>
-                </a:solidFill>
-                <a:latin typeface="Menlo Regular"/>
-                <a:cs typeface="Menlo Regular"/>
-              </a:rPr>
-              <a:t>let</a:t>
-            </a:r>
-            <a:r>
-              <a:rPr lang="en-US" sz="1200" dirty="0" smtClean="0">
-                <a:latin typeface="Menlo Regular"/>
-                <a:cs typeface="Menlo Regular"/>
-              </a:rPr>
-              <a:t> length = </a:t>
-            </a:r>
-            <a:r>
-              <a:rPr lang="en-US" sz="1200" dirty="0" err="1" smtClean="0">
-                <a:solidFill>
-                  <a:srgbClr val="247C9F"/>
-                </a:solidFill>
-                <a:latin typeface="Menlo Regular"/>
-                <a:cs typeface="Menlo Regular"/>
-              </a:rPr>
-              <a:t>Array</a:t>
-            </a:r>
-            <a:r>
-              <a:rPr lang="en-US" sz="1200" dirty="0" err="1" smtClean="0">
-                <a:latin typeface="Menlo Regular"/>
-                <a:cs typeface="Menlo Regular"/>
-              </a:rPr>
-              <a:t>.length</a:t>
-            </a:r>
-            <a:r>
-              <a:rPr lang="en-US" sz="1200" dirty="0" smtClean="0">
-                <a:latin typeface="Menlo Regular"/>
-                <a:cs typeface="Menlo Regular"/>
-              </a:rPr>
-              <a:t> data</a:t>
-            </a:r>
-          </a:p>
-          <a:p>
-            <a:pPr marL="0" indent="0">
-              <a:buNone/>
-            </a:pPr>
-            <a:r>
-              <a:rPr lang="en-US" sz="1200" dirty="0">
-                <a:latin typeface="Menlo Regular"/>
-                <a:cs typeface="Menlo Regular"/>
-              </a:rPr>
-              <a:t> </a:t>
-            </a:r>
-            <a:r>
-              <a:rPr lang="en-US" sz="1200" dirty="0" smtClean="0">
-                <a:latin typeface="Menlo Regular"/>
-                <a:cs typeface="Menlo Regular"/>
-              </a:rPr>
-              <a:t>             length </a:t>
-            </a:r>
-            <a:r>
-              <a:rPr lang="en-US" sz="1200" dirty="0" smtClean="0">
-                <a:latin typeface="Menlo Regular"/>
-                <a:cs typeface="Menlo Regular"/>
-              </a:rPr>
-              <a:t>&gt; </a:t>
-            </a:r>
-            <a:r>
-              <a:rPr lang="en-US" sz="1200" dirty="0" smtClean="0">
-                <a:solidFill>
-                  <a:schemeClr val="accent6">
-                    <a:lumMod val="60000"/>
-                    <a:lumOff val="40000"/>
-                  </a:schemeClr>
-                </a:solidFill>
-                <a:latin typeface="Menlo Regular"/>
-                <a:cs typeface="Menlo Regular"/>
-              </a:rPr>
-              <a:t>0</a:t>
-            </a:r>
-            <a:r>
-              <a:rPr lang="en-US" sz="1200" dirty="0" smtClean="0">
-                <a:latin typeface="Menlo Regular"/>
-                <a:cs typeface="Menlo Regular"/>
-              </a:rPr>
-              <a:t> &amp;</a:t>
-            </a:r>
-            <a:r>
-              <a:rPr lang="en-US" sz="1200" dirty="0" smtClean="0">
-                <a:latin typeface="Menlo Regular"/>
-                <a:cs typeface="Menlo Regular"/>
-              </a:rPr>
-              <a:t>&amp; </a:t>
-            </a:r>
-            <a:r>
-              <a:rPr lang="en-US" sz="1200" dirty="0" smtClean="0">
-                <a:latin typeface="Menlo Regular"/>
-                <a:cs typeface="Menlo Regular"/>
-              </a:rPr>
-              <a:t>length </a:t>
+              <a:t> data </a:t>
             </a:r>
             <a:r>
               <a:rPr lang="en-US" sz="1200" dirty="0">
@@ -11693,14 +11609,7 @@
                 <a:latin typeface="Menlo Regular"/>
                 <a:cs typeface="Menlo Regular"/>
               </a:rPr>
-              <a:t> </a:t>
-            </a:r>
-            <a:r>
-              <a:rPr lang="en-US" sz="1200" dirty="0">
-                <a:latin typeface="Menlo Regular"/>
-                <a:cs typeface="Menlo Regular"/>
-              </a:rPr>
-              <a:t>m</a:t>
+              <a:t> m</a:t>
             </a:r>
             <a:r>
               <a:rPr lang="en-US" sz="1200" dirty="0" smtClean="0">
@@ -23101,7 +23010,7 @@
         <p:spPr>
           <a:xfrm>
             <a:off x="3575050" y="273050"/>
-            <a:ext cx="5111750" cy="2940659"/>
+            <a:ext cx="5281820" cy="2907472"/>
           </a:xfrm>
         </p:spPr>
         <p:txBody>
@@ -23264,14 +23173,17 @@
               <a:buNone/>
             </a:pPr>
             <a:r>
-              <a:rPr lang="da-DK" sz="1200" dirty="0" smtClean="0">
+              <a:rPr lang="en-US" sz="1200" dirty="0" smtClean="0">
+                <a:solidFill>
+                  <a:srgbClr val="0000FF"/>
+                </a:solidFill>
                 <a:latin typeface="Menlo Regular"/>
                 <a:cs typeface="Menlo Regular"/>
               </a:rPr>
               <a:t>  </a:t>
             </a:r>
             <a:r>
-              <a:rPr lang="da-DK" sz="1200" dirty="0" smtClean="0">
+              <a:rPr lang="en-US" sz="1200" dirty="0" err="1" smtClean="0">
                 <a:solidFill>
                   <a:srgbClr val="0000FF"/>
                 </a:solidFill>
@@ -23281,18 +23193,41 @@
               <a:t>var</a:t>
             </a:r>
             <a:r>
-              <a:rPr lang="da-DK" sz="1200" dirty="0" smtClean="0">
+              <a:rPr lang="en-US" sz="1200" dirty="0" smtClean="0">
+                <a:solidFill>
+                  <a:srgbClr val="0000FF"/>
+                </a:solidFill>
                 <a:latin typeface="Menlo Regular"/>
                 <a:cs typeface="Menlo Regular"/>
               </a:rPr>
               <a:t> </a:t>
             </a:r>
             <a:r>
-              <a:rPr lang="da-DK" sz="1200" dirty="0">
-                <a:latin typeface="Menlo Regular"/>
-                <a:cs typeface="Menlo Regular"/>
-              </a:rPr>
-              <a:t>source = msg1.Data();</a:t>
+              <a:rPr lang="en-US" sz="1200" dirty="0" smtClean="0">
+                <a:latin typeface="Menlo Regular"/>
+                <a:cs typeface="Menlo Regular"/>
+              </a:rPr>
+              <a:t>source</a:t>
+            </a:r>
+            <a:r>
+              <a:rPr lang="en-US" sz="1200" dirty="0" smtClean="0">
+                <a:solidFill>
+                  <a:srgbClr val="0000FF"/>
+                </a:solidFill>
+                <a:latin typeface="Menlo Regular"/>
+                <a:cs typeface="Menlo Regular"/>
+              </a:rPr>
+              <a:t> </a:t>
+            </a:r>
+            <a:r>
+              <a:rPr lang="en-US" sz="1200" dirty="0" smtClean="0">
+                <a:solidFill>
+                  <a:srgbClr val="222222"/>
+                </a:solidFill>
+                <a:latin typeface="Menlo Regular"/>
+                <a:cs typeface="Menlo Regular"/>
+              </a:rPr>
+              <a:t>= msg1.Data();</a:t>
             </a:r>
           </a:p>
           <a:p>
@@ -23301,6 +23236,9 @@
             </a:pPr>
             <a:r>
               <a:rPr lang="en-US" sz="1200" dirty="0" smtClean="0">
+                <a:solidFill>
+                  <a:srgbClr val="0000FF"/>
+                </a:solidFill>
                 <a:latin typeface="Menlo Regular"/>
                 <a:cs typeface="Menlo Regular"/>
               </a:rPr>
@@ -23350,18 +23288,82 @@
               <a:buNone/>
             </a:pPr>
             <a:r>
-              <a:rPr lang="cs-CZ" sz="1200" dirty="0" smtClean="0">
+              <a:rPr lang="en-US" sz="1200" dirty="0" smtClean="0">
+                <a:latin typeface="Menlo Regular"/>
+                <a:cs typeface="Menlo Regular"/>
+              </a:rPr>
+              <a:t>  </a:t>
+            </a:r>
+            <a:r>
+              <a:rPr lang="en-US" sz="1200" dirty="0" err="1" smtClean="0">
+                <a:solidFill>
+                  <a:srgbClr val="247C9F"/>
+                </a:solidFill>
+                <a:latin typeface="Menlo Regular"/>
+                <a:cs typeface="Menlo Regular"/>
+              </a:rPr>
+              <a:t>Func</a:t>
+            </a:r>
+            <a:r>
+              <a:rPr lang="en-US" sz="1200" dirty="0">
+                <a:latin typeface="Menlo Regular"/>
+                <a:cs typeface="Menlo Regular"/>
+              </a:rPr>
+              <a:t>&lt;</a:t>
+            </a:r>
+            <a:r>
+              <a:rPr lang="en-US" sz="1200" dirty="0">
+                <a:solidFill>
+                  <a:srgbClr val="247C9F"/>
+                </a:solidFill>
+                <a:latin typeface="Menlo Regular"/>
+                <a:cs typeface="Menlo Regular"/>
+              </a:rPr>
+              <a:t>Boolean</a:t>
+            </a:r>
+            <a:r>
+              <a:rPr lang="en-US" sz="1200" dirty="0">
+                <a:latin typeface="Menlo Regular"/>
+                <a:cs typeface="Menlo Regular"/>
+              </a:rPr>
+              <a:t>&gt; after  = () =&gt; </a:t>
+            </a:r>
+            <a:r>
+              <a:rPr lang="en-US" sz="1200" dirty="0" smtClean="0">
+                <a:latin typeface="Menlo Regular"/>
+                <a:cs typeface="Menlo Regular"/>
+              </a:rPr>
+              <a:t>{  </a:t>
+            </a:r>
+            <a:endParaRPr lang="en-US" sz="1200" dirty="0">
+              <a:latin typeface="Menlo Regular"/>
+              <a:cs typeface="Menlo Regular"/>
+            </a:endParaRPr>
+          </a:p>
+          <a:p>
+            <a:pPr marL="0" indent="0">
+              <a:buNone/>
+            </a:pPr>
+            <a:r>
+              <a:rPr lang="en-US" sz="1200" dirty="0">
+                <a:latin typeface="Menlo Regular"/>
+                <a:cs typeface="Menlo Regular"/>
+              </a:rPr>
+              <a:t>  </a:t>
+            </a:r>
+            <a:r>
+              <a:rPr lang="en-US" sz="1200" dirty="0" smtClean="0">
                 <a:latin typeface="Menlo Regular"/>
                 <a:cs typeface="Menlo Regular"/>
               </a:rPr>
               <a:t>  msg1</a:t>
             </a:r>
             <a:r>
-              <a:rPr lang="cs-CZ" sz="1200" dirty="0">
-                <a:latin typeface="Menlo Regular"/>
-                <a:cs typeface="Menlo Regular"/>
-              </a:rPr>
-              <a:t>.Copy(msg2);</a:t>
+              <a:rPr lang="en-US" sz="1200" dirty="0">
+                <a:latin typeface="Menlo Regular"/>
+                <a:cs typeface="Menlo Regular"/>
+              </a:rPr>
+              <a:t>.Copy(msg2); </a:t>
             </a:r>
           </a:p>
           <a:p>
@@ -23369,6 +23371,13 @@
               <a:buNone/>
             </a:pPr>
             <a:r>
+              <a:rPr lang="en-US" sz="1200" dirty="0">
+                <a:latin typeface="Menlo Regular"/>
+                <a:cs typeface="Menlo Regular"/>
+              </a:rPr>
+              <a:t>  </a:t>
+            </a:r>
+            <a:r>
               <a:rPr lang="en-US" sz="1200" dirty="0" smtClean="0">
                 <a:latin typeface="Menlo Regular"/>
                 <a:cs typeface="Menlo Regular"/>
@@ -23376,31 +23385,122 @@
               <a:t>  </a:t>
             </a:r>
             <a:r>
-              <a:rPr lang="en-US" sz="1200" dirty="0" err="1" smtClean="0">
+              <a:rPr lang="en-US" sz="1200" dirty="0" smtClean="0">
                 <a:solidFill>
                   <a:srgbClr val="0000FF"/>
                 </a:solidFill>
                 <a:latin typeface="Menlo Regular"/>
                 <a:cs typeface="Menlo Regular"/>
               </a:rPr>
-              <a:t>var</a:t>
+              <a:t>return</a:t>
             </a:r>
             <a:r>
               <a:rPr lang="en-US" sz="1200" dirty="0" smtClean="0">
+                <a:latin typeface="Menlo Regular"/>
+                <a:cs typeface="Menlo Regular"/>
+              </a:rPr>
+              <a:t> </a:t>
+            </a:r>
+            <a:r>
+              <a:rPr lang="en-US" sz="1200" dirty="0">
+                <a:latin typeface="Menlo Regular"/>
+                <a:cs typeface="Menlo Regular"/>
+              </a:rPr>
+              <a:t>msg2.Data().</a:t>
+            </a:r>
+            <a:r>
+              <a:rPr lang="en-US" sz="1200" dirty="0" err="1">
+                <a:latin typeface="Menlo Regular"/>
+                <a:cs typeface="Menlo Regular"/>
+              </a:rPr>
+              <a:t>SequenceEqual</a:t>
+            </a:r>
+            <a:r>
+              <a:rPr lang="en-US" sz="1200" dirty="0">
+                <a:latin typeface="Menlo Regular"/>
+                <a:cs typeface="Menlo Regular"/>
+              </a:rPr>
+              <a:t>(source); </a:t>
+            </a:r>
+            <a:endParaRPr lang="en-US" sz="1200" dirty="0" smtClean="0">
+              <a:latin typeface="Menlo Regular"/>
+              <a:cs typeface="Menlo Regular"/>
+            </a:endParaRPr>
+          </a:p>
+          <a:p>
+            <a:pPr marL="0" indent="0">
+              <a:buNone/>
+            </a:pPr>
+            <a:r>
+              <a:rPr lang="en-US" sz="1200" dirty="0" smtClean="0">
+                <a:latin typeface="Menlo Regular"/>
+                <a:cs typeface="Menlo Regular"/>
+              </a:rPr>
+              <a:t>  };</a:t>
+            </a:r>
+            <a:endParaRPr lang="en-US" sz="1200" dirty="0">
+              <a:latin typeface="Menlo Regular"/>
+              <a:cs typeface="Menlo Regular"/>
+            </a:endParaRPr>
+          </a:p>
+          <a:p>
+            <a:pPr marL="0" indent="0">
+              <a:buNone/>
+            </a:pPr>
+            <a:r>
+              <a:rPr lang="en-US" sz="1200" dirty="0" smtClean="0">
+                <a:latin typeface="Menlo Regular"/>
+                <a:cs typeface="Menlo Regular"/>
+              </a:rPr>
+              <a:t>  </a:t>
+            </a:r>
+            <a:r>
+              <a:rPr lang="en-US" sz="1200" dirty="0" smtClean="0">
                 <a:solidFill>
                   <a:srgbClr val="0000FF"/>
                 </a:solidFill>
                 <a:latin typeface="Menlo Regular"/>
                 <a:cs typeface="Menlo Regular"/>
               </a:rPr>
+              <a:t>return</a:t>
+            </a:r>
+            <a:r>
+              <a:rPr lang="en-US" sz="1200" dirty="0" smtClean="0">
+                <a:latin typeface="Menlo Regular"/>
+                <a:cs typeface="Menlo Regular"/>
+              </a:rPr>
               <a:t> </a:t>
             </a:r>
             <a:r>
-              <a:rPr lang="en-US" sz="1200" dirty="0">
-                <a:latin typeface="Menlo Regular"/>
-                <a:cs typeface="Menlo Regular"/>
-              </a:rPr>
-              <a:t>after = msg2.Data();</a:t>
+              <a:rPr lang="en-US" sz="1200" dirty="0" err="1">
+                <a:latin typeface="Menlo Regular"/>
+                <a:cs typeface="Menlo Regular"/>
+              </a:rPr>
+              <a:t>after.Label</a:t>
+            </a:r>
+            <a:r>
+              <a:rPr lang="en-US" sz="1200" dirty="0">
+                <a:latin typeface="Menlo Regular"/>
+                <a:cs typeface="Menlo Regular"/>
+              </a:rPr>
+              <a:t>(</a:t>
+            </a:r>
+            <a:r>
+              <a:rPr lang="en-US" sz="1200" dirty="0">
+                <a:solidFill>
+                  <a:schemeClr val="accent5"/>
+                </a:solidFill>
+                <a:latin typeface="Menlo Regular"/>
+                <a:cs typeface="Menlo Regular"/>
+              </a:rPr>
+              <a:t>"Source"</a:t>
+            </a:r>
+            <a:r>
+              <a:rPr lang="en-US" sz="1200" dirty="0">
+                <a:latin typeface="Menlo Regular"/>
+                <a:cs typeface="Menlo Regular"/>
+              </a:rPr>
+              <a:t>)</a:t>
             </a:r>
           </a:p>
           <a:p>
@@ -23412,7 +23512,35 @@
                 <a:latin typeface="Menlo Regular"/>
                 <a:cs typeface="Menlo Regular"/>
               </a:rPr>
-              <a:t>    </a:t>
+              <a:t>            </a:t>
+            </a:r>
+            <a:r>
+              <a:rPr lang="en-US" sz="1200" dirty="0" smtClean="0">
+                <a:latin typeface="Menlo Regular"/>
+                <a:cs typeface="Menlo Regular"/>
+              </a:rPr>
+              <a:t>  .And(!msg2</a:t>
+            </a:r>
+            <a:r>
+              <a:rPr lang="en-US" sz="1200" dirty="0">
+                <a:latin typeface="Menlo Regular"/>
+                <a:cs typeface="Menlo Regular"/>
+              </a:rPr>
+              <a:t>.Data().</a:t>
+            </a:r>
+            <a:r>
+              <a:rPr lang="en-US" sz="1200" dirty="0" err="1">
+                <a:latin typeface="Menlo Regular"/>
+                <a:cs typeface="Menlo Regular"/>
+              </a:rPr>
+              <a:t>SequenceEqual</a:t>
+            </a:r>
+            <a:r>
+              <a:rPr lang="en-US" sz="1200" dirty="0">
+                <a:latin typeface="Menlo Regular"/>
+                <a:cs typeface="Menlo Regular"/>
+              </a:rPr>
+              <a:t>(before))</a:t>
             </a:r>
           </a:p>
           <a:p>
@@ -23420,137 +23548,18 @@
               <a:buNone/>
             </a:pPr>
             <a:r>
+              <a:rPr lang="en-US" sz="1200" dirty="0">
+                <a:latin typeface="Menlo Regular"/>
+                <a:cs typeface="Menlo Regular"/>
+              </a:rPr>
+              <a:t>            </a:t>
+            </a:r>
+            <a:r>
               <a:rPr lang="en-US" sz="1200" dirty="0" smtClean="0">
                 <a:latin typeface="Menlo Regular"/>
                 <a:cs typeface="Menlo Regular"/>
               </a:rPr>
-              <a:t>  </a:t>
-            </a:r>
-            <a:r>
-              <a:rPr lang="en-US" sz="1200" dirty="0" smtClean="0">
-                <a:solidFill>
-                  <a:srgbClr val="0000FF"/>
-                </a:solidFill>
-                <a:latin typeface="Menlo Regular"/>
-                <a:cs typeface="Menlo Regular"/>
-              </a:rPr>
-              <a:t>return</a:t>
-            </a:r>
-            <a:r>
-              <a:rPr lang="en-US" sz="1200" dirty="0" smtClean="0">
-                <a:latin typeface="Menlo Regular"/>
-                <a:cs typeface="Menlo Regular"/>
-              </a:rPr>
-              <a:t> </a:t>
-            </a:r>
-            <a:r>
-              <a:rPr lang="en-US" sz="1200" dirty="0" err="1" smtClean="0">
-                <a:latin typeface="Menlo Regular"/>
-                <a:cs typeface="Menlo Regular"/>
-              </a:rPr>
-              <a:t>after.SequenceEqual</a:t>
-            </a:r>
-            <a:r>
-              <a:rPr lang="en-US" sz="1200" dirty="0">
-                <a:latin typeface="Menlo Regular"/>
-                <a:cs typeface="Menlo Regular"/>
-              </a:rPr>
-              <a:t>(source</a:t>
-            </a:r>
-            <a:r>
-              <a:rPr lang="en-US" sz="1200" dirty="0" smtClean="0">
-                <a:latin typeface="Menlo Regular"/>
-                <a:cs typeface="Menlo Regular"/>
-              </a:rPr>
-              <a:t>)</a:t>
-            </a:r>
-          </a:p>
-          <a:p>
-            <a:pPr marL="0" indent="0">
-              <a:buNone/>
-            </a:pPr>
-            <a:r>
-              <a:rPr lang="en-US" sz="1200" dirty="0" smtClean="0">
-                <a:latin typeface="Menlo Regular"/>
-                <a:cs typeface="Menlo Regular"/>
-              </a:rPr>
-              <a:t>              .</a:t>
-            </a:r>
-            <a:r>
-              <a:rPr lang="en-US" sz="1200" dirty="0">
-                <a:latin typeface="Menlo Regular"/>
-                <a:cs typeface="Menlo Regular"/>
-              </a:rPr>
-              <a:t>Label(</a:t>
-            </a:r>
-            <a:r>
-              <a:rPr lang="en-US" sz="1200" dirty="0">
-                <a:solidFill>
-                  <a:srgbClr val="B5121B"/>
-                </a:solidFill>
-                <a:latin typeface="Menlo Regular"/>
-                <a:cs typeface="Menlo Regular"/>
-              </a:rPr>
-              <a:t>"Source"</a:t>
-            </a:r>
-            <a:r>
-              <a:rPr lang="en-US" sz="1200" dirty="0" smtClean="0">
-                <a:latin typeface="Menlo Regular"/>
-                <a:cs typeface="Menlo Regular"/>
-              </a:rPr>
-              <a:t>)</a:t>
-            </a:r>
-          </a:p>
-          <a:p>
-            <a:pPr marL="0" indent="0">
-              <a:buNone/>
-            </a:pPr>
-            <a:r>
-              <a:rPr lang="en-US" sz="1200" dirty="0" smtClean="0">
-                <a:latin typeface="Menlo Regular"/>
-                <a:cs typeface="Menlo Regular"/>
-              </a:rPr>
-              <a:t>              .</a:t>
-            </a:r>
-            <a:r>
-              <a:rPr lang="en-US" sz="1200" dirty="0">
-                <a:latin typeface="Menlo Regular"/>
-                <a:cs typeface="Menlo Regular"/>
-              </a:rPr>
-              <a:t>And(!</a:t>
-            </a:r>
-            <a:r>
-              <a:rPr lang="en-US" sz="1200" dirty="0" err="1">
-                <a:latin typeface="Menlo Regular"/>
-                <a:cs typeface="Menlo Regular"/>
-              </a:rPr>
-              <a:t>after.SequenceEqual</a:t>
-            </a:r>
-            <a:r>
-              <a:rPr lang="en-US" sz="1200" dirty="0">
-                <a:latin typeface="Menlo Regular"/>
-                <a:cs typeface="Menlo Regular"/>
-              </a:rPr>
-              <a:t>(before)</a:t>
-            </a:r>
-            <a:r>
-              <a:rPr lang="en-US" sz="1200" dirty="0" smtClean="0">
-                <a:latin typeface="Menlo Regular"/>
-                <a:cs typeface="Menlo Regular"/>
-              </a:rPr>
-              <a:t>)</a:t>
-            </a:r>
-          </a:p>
-          <a:p>
-            <a:pPr marL="0" indent="0">
-              <a:buNone/>
-            </a:pPr>
-            <a:r>
-              <a:rPr lang="en-US" sz="1200" dirty="0" smtClean="0">
-                <a:latin typeface="Menlo Regular"/>
-                <a:cs typeface="Menlo Regular"/>
-              </a:rPr>
-              <a:t>              .</a:t>
+              <a:t>  .</a:t>
             </a:r>
             <a:r>
               <a:rPr lang="en-US" sz="1200" dirty="0">
@@ -23704,10 +23713,6 @@
             <a:lstStyle/>
             <a:p>
               <a:pPr algn="ctr"/>
-              <a:r>
-                <a:rPr lang="en-US" dirty="0" smtClean="0"/>
-                <a:t>`</a:t>
-              </a:r>
               <a:endParaRPr lang="en-US" dirty="0"/>
             </a:p>
           </p:txBody>

</xml_diff>